<commit_message>
Definicion de significado de los estados
</commit_message>
<xml_diff>
--- a/Diseno/Modelo_Estado_Tareas.pptx
+++ b/Diseno/Modelo_Estado_Tareas.pptx
@@ -6,6 +6,7 @@
   </p:sldMasterIdLst>
   <p:sldIdLst>
     <p:sldId id="256" r:id="rId2"/>
+    <p:sldId id="257" r:id="rId3"/>
   </p:sldIdLst>
   <p:sldSz cx="12192000" cy="6858000"/>
   <p:notesSz cx="6858000" cy="9144000"/>
@@ -104,6 +105,11 @@
       </a:defRPr>
     </a:lvl9pPr>
   </p:defaultTextStyle>
+  <p:extLst>
+    <p:ext uri="{EFAFB233-063F-42B5-8137-9DF3F51BA10A}">
+      <p15:sldGuideLst xmlns:p15="http://schemas.microsoft.com/office/powerpoint/2012/main"/>
+    </p:ext>
+  </p:extLst>
 </p:presentation>
 </file>
 
@@ -238,7 +244,7 @@
           <a:p>
             <a:fld id="{AEBB6465-E99A-4CE4-B1E2-6B3D2747E610}" type="datetimeFigureOut">
               <a:rPr lang="es-ES" smtClean="0"/>
-              <a:t>02/10/2014</a:t>
+              <a:t>05/10/2014</a:t>
             </a:fld>
             <a:endParaRPr lang="es-ES"/>
           </a:p>
@@ -408,7 +414,7 @@
           <a:p>
             <a:fld id="{AEBB6465-E99A-4CE4-B1E2-6B3D2747E610}" type="datetimeFigureOut">
               <a:rPr lang="es-ES" smtClean="0"/>
-              <a:t>02/10/2014</a:t>
+              <a:t>05/10/2014</a:t>
             </a:fld>
             <a:endParaRPr lang="es-ES"/>
           </a:p>
@@ -588,7 +594,7 @@
           <a:p>
             <a:fld id="{AEBB6465-E99A-4CE4-B1E2-6B3D2747E610}" type="datetimeFigureOut">
               <a:rPr lang="es-ES" smtClean="0"/>
-              <a:t>02/10/2014</a:t>
+              <a:t>05/10/2014</a:t>
             </a:fld>
             <a:endParaRPr lang="es-ES"/>
           </a:p>
@@ -758,7 +764,7 @@
           <a:p>
             <a:fld id="{AEBB6465-E99A-4CE4-B1E2-6B3D2747E610}" type="datetimeFigureOut">
               <a:rPr lang="es-ES" smtClean="0"/>
-              <a:t>02/10/2014</a:t>
+              <a:t>05/10/2014</a:t>
             </a:fld>
             <a:endParaRPr lang="es-ES"/>
           </a:p>
@@ -1004,7 +1010,7 @@
           <a:p>
             <a:fld id="{AEBB6465-E99A-4CE4-B1E2-6B3D2747E610}" type="datetimeFigureOut">
               <a:rPr lang="es-ES" smtClean="0"/>
-              <a:t>02/10/2014</a:t>
+              <a:t>05/10/2014</a:t>
             </a:fld>
             <a:endParaRPr lang="es-ES"/>
           </a:p>
@@ -1236,7 +1242,7 @@
           <a:p>
             <a:fld id="{AEBB6465-E99A-4CE4-B1E2-6B3D2747E610}" type="datetimeFigureOut">
               <a:rPr lang="es-ES" smtClean="0"/>
-              <a:t>02/10/2014</a:t>
+              <a:t>05/10/2014</a:t>
             </a:fld>
             <a:endParaRPr lang="es-ES"/>
           </a:p>
@@ -1603,7 +1609,7 @@
           <a:p>
             <a:fld id="{AEBB6465-E99A-4CE4-B1E2-6B3D2747E610}" type="datetimeFigureOut">
               <a:rPr lang="es-ES" smtClean="0"/>
-              <a:t>02/10/2014</a:t>
+              <a:t>05/10/2014</a:t>
             </a:fld>
             <a:endParaRPr lang="es-ES"/>
           </a:p>
@@ -1721,7 +1727,7 @@
           <a:p>
             <a:fld id="{AEBB6465-E99A-4CE4-B1E2-6B3D2747E610}" type="datetimeFigureOut">
               <a:rPr lang="es-ES" smtClean="0"/>
-              <a:t>02/10/2014</a:t>
+              <a:t>05/10/2014</a:t>
             </a:fld>
             <a:endParaRPr lang="es-ES"/>
           </a:p>
@@ -1816,7 +1822,7 @@
           <a:p>
             <a:fld id="{AEBB6465-E99A-4CE4-B1E2-6B3D2747E610}" type="datetimeFigureOut">
               <a:rPr lang="es-ES" smtClean="0"/>
-              <a:t>02/10/2014</a:t>
+              <a:t>05/10/2014</a:t>
             </a:fld>
             <a:endParaRPr lang="es-ES"/>
           </a:p>
@@ -2093,7 +2099,7 @@
           <a:p>
             <a:fld id="{AEBB6465-E99A-4CE4-B1E2-6B3D2747E610}" type="datetimeFigureOut">
               <a:rPr lang="es-ES" smtClean="0"/>
-              <a:t>02/10/2014</a:t>
+              <a:t>05/10/2014</a:t>
             </a:fld>
             <a:endParaRPr lang="es-ES"/>
           </a:p>
@@ -2346,7 +2352,7 @@
           <a:p>
             <a:fld id="{AEBB6465-E99A-4CE4-B1E2-6B3D2747E610}" type="datetimeFigureOut">
               <a:rPr lang="es-ES" smtClean="0"/>
-              <a:t>02/10/2014</a:t>
+              <a:t>05/10/2014</a:t>
             </a:fld>
             <a:endParaRPr lang="es-ES"/>
           </a:p>
@@ -2559,7 +2565,7 @@
           <a:p>
             <a:fld id="{AEBB6465-E99A-4CE4-B1E2-6B3D2747E610}" type="datetimeFigureOut">
               <a:rPr lang="es-ES" smtClean="0"/>
-              <a:t>02/10/2014</a:t>
+              <a:t>05/10/2014</a:t>
             </a:fld>
             <a:endParaRPr lang="es-ES"/>
           </a:p>
@@ -4777,12 +4783,20 @@
           <a:p>
             <a:pPr algn="ctr"/>
             <a:r>
+              <a:rPr lang="es-ES" sz="1100" dirty="0" err="1">
+                <a:solidFill>
+                  <a:schemeClr val="tx1"/>
+                </a:solidFill>
+              </a:rPr>
+              <a:t>d</a:t>
+            </a:r>
+            <a:r>
               <a:rPr lang="es-ES" sz="1100" dirty="0" err="1" smtClean="0">
                 <a:solidFill>
                   <a:schemeClr val="tx1"/>
                 </a:solidFill>
               </a:rPr>
-              <a:t>Delegate,stop</a:t>
+              <a:t>elegate,stop</a:t>
             </a:r>
             <a:endParaRPr lang="es-ES" sz="1100" dirty="0">
               <a:solidFill>
@@ -8328,6 +8342,190 @@
       </p:par>
     </p:tnLst>
   </p:timing>
+</p:sld>
+</file>
+
+<file path=ppt/slides/slide2.xml><?xml version="1.0" encoding="utf-8"?>
+<p:sld xmlns:a="http://schemas.openxmlformats.org/drawingml/2006/main" xmlns:r="http://schemas.openxmlformats.org/officeDocument/2006/relationships" xmlns:p="http://schemas.openxmlformats.org/presentationml/2006/main">
+  <p:cSld>
+    <p:spTree>
+      <p:nvGrpSpPr>
+        <p:cNvPr id="1" name=""/>
+        <p:cNvGrpSpPr/>
+        <p:nvPr/>
+      </p:nvGrpSpPr>
+      <p:grpSpPr>
+        <a:xfrm>
+          <a:off x="0" y="0"/>
+          <a:ext cx="0" cy="0"/>
+          <a:chOff x="0" y="0"/>
+          <a:chExt cx="0" cy="0"/>
+        </a:xfrm>
+      </p:grpSpPr>
+      <p:sp>
+        <p:nvSpPr>
+          <p:cNvPr id="2" name="Título 1"/>
+          <p:cNvSpPr>
+            <a:spLocks noGrp="1"/>
+          </p:cNvSpPr>
+          <p:nvPr>
+            <p:ph type="title"/>
+          </p:nvPr>
+        </p:nvSpPr>
+        <p:spPr/>
+        <p:txBody>
+          <a:bodyPr/>
+          <a:lstStyle/>
+          <a:p>
+            <a:r>
+              <a:rPr lang="es-ES" dirty="0" smtClean="0"/>
+              <a:t>Definición de los estados</a:t>
+            </a:r>
+            <a:endParaRPr lang="es-ES" dirty="0"/>
+          </a:p>
+        </p:txBody>
+      </p:sp>
+      <p:graphicFrame>
+        <p:nvGraphicFramePr>
+          <p:cNvPr id="4" name="Marcador de contenido 3"/>
+          <p:cNvGraphicFramePr>
+            <a:graphicFrameLocks noGrp="1"/>
+          </p:cNvGraphicFramePr>
+          <p:nvPr>
+            <p:ph idx="1"/>
+            <p:extLst>
+              <p:ext uri="{D42A27DB-BD31-4B8C-83A1-F6EECF244321}">
+                <p14:modId xmlns:p14="http://schemas.microsoft.com/office/powerpoint/2010/main" val="1847810068"/>
+              </p:ext>
+            </p:extLst>
+          </p:nvPr>
+        </p:nvGraphicFramePr>
+        <p:xfrm>
+          <a:off x="838200" y="1825625"/>
+          <a:ext cx="10515600" cy="1651000"/>
+        </p:xfrm>
+        <a:graphic>
+          <a:graphicData uri="http://schemas.openxmlformats.org/drawingml/2006/table">
+            <a:tbl>
+              <a:tblPr firstRow="1" bandRow="1">
+                <a:tableStyleId>{5C22544A-7EE6-4342-B048-85BDC9FD1C3A}</a:tableStyleId>
+              </a:tblPr>
+              <a:tblGrid>
+                <a:gridCol w="1847850"/>
+                <a:gridCol w="8667750"/>
+              </a:tblGrid>
+              <a:tr h="370840">
+                <a:tc>
+                  <a:txBody>
+                    <a:bodyPr/>
+                    <a:lstStyle/>
+                    <a:p>
+                      <a:r>
+                        <a:rPr lang="es-ES" dirty="0" smtClean="0"/>
+                        <a:t>ESTADO</a:t>
+                      </a:r>
+                      <a:endParaRPr lang="es-ES" dirty="0"/>
+                    </a:p>
+                  </a:txBody>
+                  <a:tcPr/>
+                </a:tc>
+                <a:tc>
+                  <a:txBody>
+                    <a:bodyPr/>
+                    <a:lstStyle/>
+                    <a:p>
+                      <a:r>
+                        <a:rPr lang="es-ES" dirty="0" smtClean="0"/>
+                        <a:t>DESCRIPTION</a:t>
+                      </a:r>
+                      <a:endParaRPr lang="es-ES" dirty="0"/>
+                    </a:p>
+                  </a:txBody>
+                  <a:tcPr/>
+                </a:tc>
+              </a:tr>
+              <a:tr h="370840">
+                <a:tc>
+                  <a:txBody>
+                    <a:bodyPr/>
+                    <a:lstStyle/>
+                    <a:p>
+                      <a:r>
+                        <a:rPr lang="es-ES" dirty="0" smtClean="0"/>
+                        <a:t>READY</a:t>
+                      </a:r>
+                      <a:endParaRPr lang="es-ES" dirty="0"/>
+                    </a:p>
+                  </a:txBody>
+                  <a:tcPr/>
+                </a:tc>
+                <a:tc>
+                  <a:txBody>
+                    <a:bodyPr/>
+                    <a:lstStyle/>
+                    <a:p>
+                      <a:r>
+                        <a:rPr lang="es-ES" dirty="0" smtClean="0"/>
+                        <a:t>La tarea</a:t>
+                      </a:r>
+                      <a:r>
+                        <a:rPr lang="es-ES" baseline="0" dirty="0" smtClean="0"/>
+                        <a:t> se encuentra lista para que un miembro del grupo de participantes que ha sido nominado para realizar la tarea pueda reclamarla y con ello reservarla para ejecutarla.</a:t>
+                      </a:r>
+                      <a:endParaRPr lang="es-ES" dirty="0"/>
+                    </a:p>
+                  </a:txBody>
+                  <a:tcPr/>
+                </a:tc>
+              </a:tr>
+              <a:tr h="370840">
+                <a:tc>
+                  <a:txBody>
+                    <a:bodyPr/>
+                    <a:lstStyle/>
+                    <a:p>
+                      <a:r>
+                        <a:rPr lang="es-ES" dirty="0" smtClean="0"/>
+                        <a:t>RESERVED</a:t>
+                      </a:r>
+                      <a:endParaRPr lang="es-ES" dirty="0"/>
+                    </a:p>
+                  </a:txBody>
+                  <a:tcPr/>
+                </a:tc>
+                <a:tc>
+                  <a:txBody>
+                    <a:bodyPr/>
+                    <a:lstStyle/>
+                    <a:p>
+                      <a:r>
+                        <a:rPr lang="es-ES" dirty="0" smtClean="0"/>
+                        <a:t>La tarea ha sido asignada a un participante</a:t>
+                      </a:r>
+                      <a:r>
+                        <a:rPr lang="es-ES" baseline="0" dirty="0" smtClean="0"/>
+                        <a:t> específico para su ejecución. Los demás participante ya no podrán ejecutar la tarea.</a:t>
+                      </a:r>
+                      <a:endParaRPr lang="es-ES" dirty="0"/>
+                    </a:p>
+                  </a:txBody>
+                  <a:tcPr/>
+                </a:tc>
+              </a:tr>
+            </a:tbl>
+          </a:graphicData>
+        </a:graphic>
+      </p:graphicFrame>
+    </p:spTree>
+    <p:extLst>
+      <p:ext uri="{BB962C8B-B14F-4D97-AF65-F5344CB8AC3E}">
+        <p14:creationId xmlns:p14="http://schemas.microsoft.com/office/powerpoint/2010/main" val="4969374"/>
+      </p:ext>
+    </p:extLst>
+  </p:cSld>
+  <p:clrMapOvr>
+    <a:masterClrMapping/>
+  </p:clrMapOvr>
 </p:sld>
 </file>
 

</xml_diff>

<commit_message>
Incoporacion del Modelo de Estados de las tareas
</commit_message>
<xml_diff>
--- a/Diseno/Modelo_Estado_Tareas.pptx
+++ b/Diseno/Modelo_Estado_Tareas.pptx
@@ -5,8 +5,10 @@
     <p:sldMasterId id="2147483648" r:id="rId1"/>
   </p:sldMasterIdLst>
   <p:sldIdLst>
-    <p:sldId id="256" r:id="rId2"/>
-    <p:sldId id="257" r:id="rId3"/>
+    <p:sldId id="258" r:id="rId2"/>
+    <p:sldId id="259" r:id="rId3"/>
+    <p:sldId id="256" r:id="rId4"/>
+    <p:sldId id="257" r:id="rId5"/>
   </p:sldIdLst>
   <p:sldSz cx="12192000" cy="6858000"/>
   <p:notesSz cx="6858000" cy="9144000"/>
@@ -244,7 +246,7 @@
           <a:p>
             <a:fld id="{AEBB6465-E99A-4CE4-B1E2-6B3D2747E610}" type="datetimeFigureOut">
               <a:rPr lang="es-ES" smtClean="0"/>
-              <a:t>05/10/2014</a:t>
+              <a:t>18/10/2014</a:t>
             </a:fld>
             <a:endParaRPr lang="es-ES"/>
           </a:p>
@@ -414,7 +416,7 @@
           <a:p>
             <a:fld id="{AEBB6465-E99A-4CE4-B1E2-6B3D2747E610}" type="datetimeFigureOut">
               <a:rPr lang="es-ES" smtClean="0"/>
-              <a:t>05/10/2014</a:t>
+              <a:t>18/10/2014</a:t>
             </a:fld>
             <a:endParaRPr lang="es-ES"/>
           </a:p>
@@ -594,7 +596,7 @@
           <a:p>
             <a:fld id="{AEBB6465-E99A-4CE4-B1E2-6B3D2747E610}" type="datetimeFigureOut">
               <a:rPr lang="es-ES" smtClean="0"/>
-              <a:t>05/10/2014</a:t>
+              <a:t>18/10/2014</a:t>
             </a:fld>
             <a:endParaRPr lang="es-ES"/>
           </a:p>
@@ -764,7 +766,7 @@
           <a:p>
             <a:fld id="{AEBB6465-E99A-4CE4-B1E2-6B3D2747E610}" type="datetimeFigureOut">
               <a:rPr lang="es-ES" smtClean="0"/>
-              <a:t>05/10/2014</a:t>
+              <a:t>18/10/2014</a:t>
             </a:fld>
             <a:endParaRPr lang="es-ES"/>
           </a:p>
@@ -1010,7 +1012,7 @@
           <a:p>
             <a:fld id="{AEBB6465-E99A-4CE4-B1E2-6B3D2747E610}" type="datetimeFigureOut">
               <a:rPr lang="es-ES" smtClean="0"/>
-              <a:t>05/10/2014</a:t>
+              <a:t>18/10/2014</a:t>
             </a:fld>
             <a:endParaRPr lang="es-ES"/>
           </a:p>
@@ -1242,7 +1244,7 @@
           <a:p>
             <a:fld id="{AEBB6465-E99A-4CE4-B1E2-6B3D2747E610}" type="datetimeFigureOut">
               <a:rPr lang="es-ES" smtClean="0"/>
-              <a:t>05/10/2014</a:t>
+              <a:t>18/10/2014</a:t>
             </a:fld>
             <a:endParaRPr lang="es-ES"/>
           </a:p>
@@ -1609,7 +1611,7 @@
           <a:p>
             <a:fld id="{AEBB6465-E99A-4CE4-B1E2-6B3D2747E610}" type="datetimeFigureOut">
               <a:rPr lang="es-ES" smtClean="0"/>
-              <a:t>05/10/2014</a:t>
+              <a:t>18/10/2014</a:t>
             </a:fld>
             <a:endParaRPr lang="es-ES"/>
           </a:p>
@@ -1727,7 +1729,7 @@
           <a:p>
             <a:fld id="{AEBB6465-E99A-4CE4-B1E2-6B3D2747E610}" type="datetimeFigureOut">
               <a:rPr lang="es-ES" smtClean="0"/>
-              <a:t>05/10/2014</a:t>
+              <a:t>18/10/2014</a:t>
             </a:fld>
             <a:endParaRPr lang="es-ES"/>
           </a:p>
@@ -1822,7 +1824,7 @@
           <a:p>
             <a:fld id="{AEBB6465-E99A-4CE4-B1E2-6B3D2747E610}" type="datetimeFigureOut">
               <a:rPr lang="es-ES" smtClean="0"/>
-              <a:t>05/10/2014</a:t>
+              <a:t>18/10/2014</a:t>
             </a:fld>
             <a:endParaRPr lang="es-ES"/>
           </a:p>
@@ -2099,7 +2101,7 @@
           <a:p>
             <a:fld id="{AEBB6465-E99A-4CE4-B1E2-6B3D2747E610}" type="datetimeFigureOut">
               <a:rPr lang="es-ES" smtClean="0"/>
-              <a:t>05/10/2014</a:t>
+              <a:t>18/10/2014</a:t>
             </a:fld>
             <a:endParaRPr lang="es-ES"/>
           </a:p>
@@ -2352,7 +2354,7 @@
           <a:p>
             <a:fld id="{AEBB6465-E99A-4CE4-B1E2-6B3D2747E610}" type="datetimeFigureOut">
               <a:rPr lang="es-ES" smtClean="0"/>
-              <a:t>05/10/2014</a:t>
+              <a:t>18/10/2014</a:t>
             </a:fld>
             <a:endParaRPr lang="es-ES"/>
           </a:p>
@@ -2565,7 +2567,7 @@
           <a:p>
             <a:fld id="{AEBB6465-E99A-4CE4-B1E2-6B3D2747E610}" type="datetimeFigureOut">
               <a:rPr lang="es-ES" smtClean="0"/>
-              <a:t>05/10/2014</a:t>
+              <a:t>18/10/2014</a:t>
             </a:fld>
             <a:endParaRPr lang="es-ES"/>
           </a:p>
@@ -2972,6 +2974,128 @@
       </p:grpSpPr>
       <p:sp>
         <p:nvSpPr>
+          <p:cNvPr id="2" name="Título 1"/>
+          <p:cNvSpPr>
+            <a:spLocks noGrp="1"/>
+          </p:cNvSpPr>
+          <p:nvPr>
+            <p:ph type="ctrTitle"/>
+          </p:nvPr>
+        </p:nvSpPr>
+        <p:spPr/>
+        <p:txBody>
+          <a:bodyPr/>
+          <a:lstStyle/>
+          <a:p>
+            <a:endParaRPr lang="es-ES"/>
+          </a:p>
+        </p:txBody>
+      </p:sp>
+      <p:sp>
+        <p:nvSpPr>
+          <p:cNvPr id="3" name="Subtítulo 2"/>
+          <p:cNvSpPr>
+            <a:spLocks noGrp="1"/>
+          </p:cNvSpPr>
+          <p:nvPr>
+            <p:ph type="subTitle" idx="1"/>
+          </p:nvPr>
+        </p:nvSpPr>
+        <p:spPr/>
+        <p:txBody>
+          <a:bodyPr/>
+          <a:lstStyle/>
+          <a:p>
+            <a:endParaRPr lang="es-ES"/>
+          </a:p>
+        </p:txBody>
+      </p:sp>
+    </p:spTree>
+    <p:extLst>
+      <p:ext uri="{BB962C8B-B14F-4D97-AF65-F5344CB8AC3E}">
+        <p14:creationId xmlns:p14="http://schemas.microsoft.com/office/powerpoint/2010/main" val="4288755412"/>
+      </p:ext>
+    </p:extLst>
+  </p:cSld>
+  <p:clrMapOvr>
+    <a:masterClrMapping/>
+  </p:clrMapOvr>
+</p:sld>
+</file>
+
+<file path=ppt/slides/slide2.xml><?xml version="1.0" encoding="utf-8"?>
+<p:sld xmlns:a="http://schemas.openxmlformats.org/drawingml/2006/main" xmlns:r="http://schemas.openxmlformats.org/officeDocument/2006/relationships" xmlns:p="http://schemas.openxmlformats.org/presentationml/2006/main">
+  <p:cSld>
+    <p:spTree>
+      <p:nvGrpSpPr>
+        <p:cNvPr id="1" name=""/>
+        <p:cNvGrpSpPr/>
+        <p:nvPr/>
+      </p:nvGrpSpPr>
+      <p:grpSpPr>
+        <a:xfrm>
+          <a:off x="0" y="0"/>
+          <a:ext cx="0" cy="0"/>
+          <a:chOff x="0" y="0"/>
+          <a:chExt cx="0" cy="0"/>
+        </a:xfrm>
+      </p:grpSpPr>
+      <p:pic>
+        <p:nvPicPr>
+          <p:cNvPr id="5" name="Imagen 4"/>
+          <p:cNvPicPr>
+            <a:picLocks noChangeAspect="1"/>
+          </p:cNvPicPr>
+          <p:nvPr/>
+        </p:nvPicPr>
+        <p:blipFill>
+          <a:blip r:embed="rId2"/>
+          <a:stretch>
+            <a:fillRect/>
+          </a:stretch>
+        </p:blipFill>
+        <p:spPr>
+          <a:xfrm>
+            <a:off x="1757362" y="881062"/>
+            <a:ext cx="7962900" cy="5724525"/>
+          </a:xfrm>
+          <a:prstGeom prst="rect">
+            <a:avLst/>
+          </a:prstGeom>
+        </p:spPr>
+      </p:pic>
+    </p:spTree>
+    <p:extLst>
+      <p:ext uri="{BB962C8B-B14F-4D97-AF65-F5344CB8AC3E}">
+        <p14:creationId xmlns:p14="http://schemas.microsoft.com/office/powerpoint/2010/main" val="2513430359"/>
+      </p:ext>
+    </p:extLst>
+  </p:cSld>
+  <p:clrMapOvr>
+    <a:masterClrMapping/>
+  </p:clrMapOvr>
+</p:sld>
+</file>
+
+<file path=ppt/slides/slide3.xml><?xml version="1.0" encoding="utf-8"?>
+<p:sld xmlns:a="http://schemas.openxmlformats.org/drawingml/2006/main" xmlns:r="http://schemas.openxmlformats.org/officeDocument/2006/relationships" xmlns:p="http://schemas.openxmlformats.org/presentationml/2006/main">
+  <p:cSld>
+    <p:spTree>
+      <p:nvGrpSpPr>
+        <p:cNvPr id="1" name=""/>
+        <p:cNvGrpSpPr/>
+        <p:nvPr/>
+      </p:nvGrpSpPr>
+      <p:grpSpPr>
+        <a:xfrm>
+          <a:off x="0" y="0"/>
+          <a:ext cx="0" cy="0"/>
+          <a:chOff x="0" y="0"/>
+          <a:chExt cx="0" cy="0"/>
+        </a:xfrm>
+      </p:grpSpPr>
+      <p:sp>
+        <p:nvSpPr>
           <p:cNvPr id="4" name="Rectángulo redondeado 3"/>
           <p:cNvSpPr/>
           <p:nvPr/>
@@ -8345,7 +8469,7 @@
 </p:sld>
 </file>
 
-<file path=ppt/slides/slide2.xml><?xml version="1.0" encoding="utf-8"?>
+<file path=ppt/slides/slide4.xml><?xml version="1.0" encoding="utf-8"?>
 <p:sld xmlns:a="http://schemas.openxmlformats.org/drawingml/2006/main" xmlns:r="http://schemas.openxmlformats.org/officeDocument/2006/relationships" xmlns:p="http://schemas.openxmlformats.org/presentationml/2006/main">
   <p:cSld>
     <p:spTree>

</xml_diff>